<commit_message>
Fix diagram bugs in Model and Storage
</commit_message>
<xml_diff>
--- a/docs/diagrams/ModelComponentClassDiagram.pptx
+++ b/docs/diagrams/ModelComponentClassDiagram.pptx
@@ -4930,7 +4930,7 @@
         </p:nvSpPr>
         <p:spPr>
           <a:xfrm>
-            <a:off x="2573394" y="2756715"/>
+            <a:off x="2649290" y="2792281"/>
             <a:ext cx="170110" cy="137542"/>
           </a:xfrm>
           <a:prstGeom prst="rect">
@@ -4951,7 +4951,7 @@
                   <a:srgbClr val="7030A0"/>
                 </a:solidFill>
               </a:rPr>
-              <a:t>1</a:t>
+              <a:t>4</a:t>
             </a:r>
             <a:endParaRPr lang="en-SG" sz="1100" dirty="0">
               <a:solidFill>

</xml_diff>